<commit_message>
Revert "Revert "11-15 ppt""
This reverts commit fe5a1238690c086ff4f86737e3b7e0c28328f316.
</commit_message>
<xml_diff>
--- a/开发文档/需求分析(SRS)/SE2020-G10-需求分析0.0.1.pptx
+++ b/开发文档/需求分析(SRS)/SE2020-G10-需求分析0.0.1.pptx
@@ -11468,7 +11468,7 @@
       </p:sp>
       <p:pic>
         <p:nvPicPr>
-          <p:cNvPr id="-2147482622" name="图片 -2147482623" descr="系统流程图"/>
+          <p:cNvPr id="3" name="图片 -2147482623" descr="系统流程图"/>
           <p:cNvPicPr>
             <a:picLocks noChangeAspect="1"/>
           </p:cNvPicPr>
@@ -11496,7 +11496,7 @@
       </p:pic>
       <p:sp>
         <p:nvSpPr>
-          <p:cNvPr id="3" name="文本框 2"/>
+          <p:cNvPr id="5" name="文本框 4"/>
           <p:cNvSpPr txBox="1"/>
           <p:nvPr/>
         </p:nvSpPr>
@@ -11529,7 +11529,7 @@
       </p:sp>
       <p:sp>
         <p:nvSpPr>
-          <p:cNvPr id="5" name="文本框 4"/>
+          <p:cNvPr id="6" name="文本框 5"/>
           <p:cNvSpPr txBox="1"/>
           <p:nvPr/>
         </p:nvSpPr>
@@ -11566,7 +11566,7 @@
       </p:sp>
       <p:sp>
         <p:nvSpPr>
-          <p:cNvPr id="6" name="文本框 5"/>
+          <p:cNvPr id="8" name="文本框 7"/>
           <p:cNvSpPr txBox="1"/>
           <p:nvPr/>
         </p:nvSpPr>
@@ -11595,7 +11595,7 @@
       </p:sp>
       <p:sp>
         <p:nvSpPr>
-          <p:cNvPr id="8" name="文本框 7"/>
+          <p:cNvPr id="10" name="文本框 9"/>
           <p:cNvSpPr txBox="1"/>
           <p:nvPr/>
         </p:nvSpPr>
@@ -11624,7 +11624,7 @@
       </p:sp>
       <p:sp>
         <p:nvSpPr>
-          <p:cNvPr id="10" name="文本框 9"/>
+          <p:cNvPr id="11" name="文本框 10"/>
           <p:cNvSpPr txBox="1"/>
           <p:nvPr/>
         </p:nvSpPr>
@@ -11972,79 +11972,9 @@
           </a:p>
         </p:txBody>
       </p:sp>
-      <p:sp>
-        <p:nvSpPr>
-          <p:cNvPr id="13" name="文本框 12"/>
-          <p:cNvSpPr txBox="1"/>
-          <p:nvPr/>
-        </p:nvSpPr>
-        <p:spPr>
-          <a:xfrm>
-            <a:off x="8274050" y="2953385"/>
-            <a:ext cx="527050" cy="368300"/>
-          </a:xfrm>
-          <a:prstGeom prst="rect">
-            <a:avLst/>
-          </a:prstGeom>
-          <a:noFill/>
-        </p:spPr>
-        <p:txBody>
-          <a:bodyPr wrap="none" rtlCol="0">
-            <a:spAutoFit/>
-          </a:bodyPr>
-          <a:p>
-            <a:r>
-              <a:rPr lang="zh-CN" altLang="en-US"/>
-              <a:t>图</a:t>
-            </a:r>
-            <a:r>
-              <a:rPr lang="en-US" altLang="zh-CN"/>
-              <a:t>2</a:t>
-            </a:r>
-            <a:endParaRPr lang="en-US" altLang="zh-CN"/>
-          </a:p>
-        </p:txBody>
-      </p:sp>
-      <p:sp>
-        <p:nvSpPr>
-          <p:cNvPr id="14" name="文本框 13"/>
-          <p:cNvSpPr txBox="1"/>
-          <p:nvPr/>
-        </p:nvSpPr>
-        <p:spPr>
-          <a:xfrm>
-            <a:off x="1692910" y="2343785"/>
-            <a:ext cx="2127250" cy="368300"/>
-          </a:xfrm>
-          <a:prstGeom prst="rect">
-            <a:avLst/>
-          </a:prstGeom>
-          <a:noFill/>
-        </p:spPr>
-        <p:txBody>
-          <a:bodyPr wrap="none" rtlCol="0">
-            <a:spAutoFit/>
-          </a:bodyPr>
-          <a:p>
-            <a:r>
-              <a:rPr lang="zh-CN" altLang="en-US"/>
-              <a:t>图</a:t>
-            </a:r>
-            <a:r>
-              <a:rPr lang="en-US" altLang="zh-CN"/>
-              <a:t>2</a:t>
-            </a:r>
-            <a:r>
-              <a:rPr lang="zh-CN" altLang="en-US"/>
-              <a:t>为顶层数据流图</a:t>
-            </a:r>
-            <a:endParaRPr lang="zh-CN" altLang="en-US"/>
-          </a:p>
-        </p:txBody>
-      </p:sp>
       <p:pic>
         <p:nvPicPr>
-          <p:cNvPr id="15" name="图片 14" descr="顶层数据流图"/>
+          <p:cNvPr id="3" name="图片 2" descr="数据流图"/>
           <p:cNvPicPr>
             <a:picLocks noChangeAspect="1"/>
           </p:cNvPicPr>
@@ -12058,8 +11988,8 @@
         </p:blipFill>
         <p:spPr>
           <a:xfrm>
-            <a:off x="5991860" y="1411605"/>
-            <a:ext cx="5091430" cy="1300480"/>
+            <a:off x="1414780" y="1972945"/>
+            <a:ext cx="9361805" cy="4587240"/>
           </a:xfrm>
           <a:prstGeom prst="rect">
             <a:avLst/>
@@ -12807,7 +12737,7 @@
         </p:nvGrpSpPr>
         <p:grpSpPr>
           <a:xfrm>
-            <a:off x="4453448" y="2796913"/>
+            <a:off x="1232728" y="2760083"/>
             <a:ext cx="2319215" cy="2319215"/>
             <a:chOff x="2938584" y="2242373"/>
             <a:chExt cx="2319215" cy="2319215"/>
@@ -12853,8 +12783,8 @@
           </p:nvSpPr>
           <p:spPr>
             <a:xfrm>
-              <a:off x="3557017" y="2727435"/>
-              <a:ext cx="480060" cy="306705"/>
+              <a:off x="3816097" y="2727435"/>
+              <a:ext cx="621665" cy="521970"/>
             </a:xfrm>
             <a:prstGeom prst="rect">
               <a:avLst/>
@@ -12873,7 +12803,22 @@
                   <a:ea typeface="微软雅黑 Light" panose="020B0502040204020203" pitchFamily="34" charset="-122"/>
                   <a:cs typeface="微软雅黑 Light" panose="020B0502040204020203" pitchFamily="34" charset="-122"/>
                 </a:rPr>
-                <a:t>SRS</a:t>
+                <a:t> SRS</a:t>
+              </a:r>
+              <a:endParaRPr kumimoji="1" lang="en-US" altLang="zh-CN" sz="1400" dirty="0">
+                <a:latin typeface="微软雅黑 Light" panose="020B0502040204020203" pitchFamily="34" charset="-122"/>
+                <a:ea typeface="微软雅黑 Light" panose="020B0502040204020203" pitchFamily="34" charset="-122"/>
+                <a:cs typeface="微软雅黑 Light" panose="020B0502040204020203" pitchFamily="34" charset="-122"/>
+              </a:endParaRPr>
+            </a:p>
+            <a:p>
+              <a:r>
+                <a:rPr kumimoji="1" lang="en-US" altLang="zh-CN" sz="1400" dirty="0">
+                  <a:latin typeface="微软雅黑 Light" panose="020B0502040204020203" pitchFamily="34" charset="-122"/>
+                  <a:ea typeface="微软雅黑 Light" panose="020B0502040204020203" pitchFamily="34" charset="-122"/>
+                  <a:cs typeface="微软雅黑 Light" panose="020B0502040204020203" pitchFamily="34" charset="-122"/>
+                </a:rPr>
+                <a:t>v0.0.1</a:t>
               </a:r>
               <a:endParaRPr kumimoji="1" lang="en-US" altLang="zh-CN" sz="1400" dirty="0">
                 <a:latin typeface="微软雅黑 Light" panose="020B0502040204020203" pitchFamily="34" charset="-122"/>
@@ -12892,7 +12837,7 @@
         </p:nvSpPr>
         <p:spPr>
           <a:xfrm>
-            <a:off x="3861725" y="5258804"/>
+            <a:off x="641005" y="5221974"/>
             <a:ext cx="3342640" cy="368300"/>
           </a:xfrm>
           <a:prstGeom prst="rect">
@@ -12939,8 +12884,8 @@
         </p:nvSpPr>
         <p:spPr>
           <a:xfrm>
-            <a:off x="4997740" y="5769780"/>
-            <a:ext cx="1287532" cy="369332"/>
+            <a:off x="1777020" y="5732950"/>
+            <a:ext cx="1191895" cy="368300"/>
           </a:xfrm>
           <a:prstGeom prst="rect">
             <a:avLst/>
@@ -12959,9 +12904,400 @@
                 <a:ea typeface="微软雅黑 Light" panose="020B0502040204020203" pitchFamily="34" charset="-122"/>
                 <a:cs typeface="微软雅黑 Light" panose="020B0502040204020203" pitchFamily="34" charset="-122"/>
               </a:rPr>
-              <a:t>2020.10.24</a:t>
-            </a:r>
-            <a:endParaRPr kumimoji="1" lang="zh-CN" altLang="en-US" dirty="0">
+              <a:t>2020.11.</a:t>
+            </a:r>
+            <a:r>
+              <a:rPr kumimoji="1" lang="en-US" dirty="0" smtClean="0">
+                <a:latin typeface="微软雅黑 Light" panose="020B0502040204020203" pitchFamily="34" charset="-122"/>
+                <a:ea typeface="微软雅黑 Light" panose="020B0502040204020203" pitchFamily="34" charset="-122"/>
+                <a:cs typeface="微软雅黑 Light" panose="020B0502040204020203" pitchFamily="34" charset="-122"/>
+              </a:rPr>
+              <a:t>13</a:t>
+            </a:r>
+            <a:endParaRPr kumimoji="1" lang="en-US" dirty="0">
+              <a:latin typeface="微软雅黑 Light" panose="020B0502040204020203" pitchFamily="34" charset="-122"/>
+              <a:ea typeface="微软雅黑 Light" panose="020B0502040204020203" pitchFamily="34" charset="-122"/>
+              <a:cs typeface="微软雅黑 Light" panose="020B0502040204020203" pitchFamily="34" charset="-122"/>
+            </a:endParaRPr>
+          </a:p>
+        </p:txBody>
+      </p:sp>
+      <p:grpSp>
+        <p:nvGrpSpPr>
+          <p:cNvPr id="16" name="组 5"/>
+          <p:cNvGrpSpPr/>
+          <p:nvPr/>
+        </p:nvGrpSpPr>
+        <p:grpSpPr>
+          <a:xfrm>
+            <a:off x="4712528" y="2787388"/>
+            <a:ext cx="2319215" cy="2319215"/>
+            <a:chOff x="2938584" y="2242373"/>
+            <a:chExt cx="2319215" cy="2319215"/>
+          </a:xfrm>
+        </p:grpSpPr>
+        <p:pic>
+          <p:nvPicPr>
+            <p:cNvPr id="17" name="图片 3">
+              <a:hlinkClick r:id="rId4" action="ppaction://hlinkfile"/>
+            </p:cNvPr>
+            <p:cNvPicPr>
+              <a:picLocks noChangeAspect="1"/>
+            </p:cNvPicPr>
+            <p:nvPr/>
+          </p:nvPicPr>
+          <p:blipFill>
+            <a:blip r:embed="rId5" cstate="print">
+              <a:extLst>
+                <a:ext uri="{28A0092B-C50C-407E-A947-70E740481C1C}">
+                  <a14:useLocalDpi xmlns:a14="http://schemas.microsoft.com/office/drawing/2010/main" val="0"/>
+                </a:ext>
+              </a:extLst>
+            </a:blip>
+            <a:stretch>
+              <a:fillRect/>
+            </a:stretch>
+          </p:blipFill>
+          <p:spPr>
+            <a:xfrm>
+              <a:off x="2938584" y="2242373"/>
+              <a:ext cx="2319215" cy="2319215"/>
+            </a:xfrm>
+            <a:prstGeom prst="rect">
+              <a:avLst/>
+            </a:prstGeom>
+          </p:spPr>
+        </p:pic>
+        <p:sp>
+          <p:nvSpPr>
+            <p:cNvPr id="18" name="文本框 4"/>
+            <p:cNvSpPr txBox="1"/>
+            <p:nvPr/>
+          </p:nvSpPr>
+          <p:spPr>
+            <a:xfrm>
+              <a:off x="3816097" y="2727435"/>
+              <a:ext cx="652145" cy="521970"/>
+            </a:xfrm>
+            <a:prstGeom prst="rect">
+              <a:avLst/>
+            </a:prstGeom>
+            <a:noFill/>
+          </p:spPr>
+          <p:txBody>
+            <a:bodyPr wrap="none" rtlCol="0">
+              <a:spAutoFit/>
+            </a:bodyPr>
+            <a:p>
+              <a:r>
+                <a:rPr kumimoji="1" lang="en-US" altLang="zh-CN" sz="1400" dirty="0">
+                  <a:latin typeface="微软雅黑 Light" panose="020B0502040204020203" pitchFamily="34" charset="-122"/>
+                  <a:ea typeface="微软雅黑 Light" panose="020B0502040204020203" pitchFamily="34" charset="-122"/>
+                  <a:cs typeface="微软雅黑 Light" panose="020B0502040204020203" pitchFamily="34" charset="-122"/>
+                </a:rPr>
+                <a:t> SRS</a:t>
+              </a:r>
+              <a:endParaRPr kumimoji="1" lang="en-US" altLang="zh-CN" sz="1400" dirty="0">
+                <a:latin typeface="微软雅黑 Light" panose="020B0502040204020203" pitchFamily="34" charset="-122"/>
+                <a:ea typeface="微软雅黑 Light" panose="020B0502040204020203" pitchFamily="34" charset="-122"/>
+                <a:cs typeface="微软雅黑 Light" panose="020B0502040204020203" pitchFamily="34" charset="-122"/>
+              </a:endParaRPr>
+            </a:p>
+            <a:p>
+              <a:r>
+                <a:rPr kumimoji="1" lang="en-US" altLang="zh-CN" sz="1400" dirty="0">
+                  <a:latin typeface="微软雅黑 Light" panose="020B0502040204020203" pitchFamily="34" charset="-122"/>
+                  <a:ea typeface="微软雅黑 Light" panose="020B0502040204020203" pitchFamily="34" charset="-122"/>
+                  <a:cs typeface="微软雅黑 Light" panose="020B0502040204020203" pitchFamily="34" charset="-122"/>
+                </a:rPr>
+                <a:t>v0.0.2</a:t>
+              </a:r>
+              <a:endParaRPr kumimoji="1" lang="en-US" altLang="zh-CN" sz="1400" dirty="0">
+                <a:latin typeface="微软雅黑 Light" panose="020B0502040204020203" pitchFamily="34" charset="-122"/>
+                <a:ea typeface="微软雅黑 Light" panose="020B0502040204020203" pitchFamily="34" charset="-122"/>
+                <a:cs typeface="微软雅黑 Light" panose="020B0502040204020203" pitchFamily="34" charset="-122"/>
+              </a:endParaRPr>
+            </a:p>
+          </p:txBody>
+        </p:sp>
+      </p:grpSp>
+      <p:sp>
+        <p:nvSpPr>
+          <p:cNvPr id="19" name="文本框 6"/>
+          <p:cNvSpPr txBox="1"/>
+          <p:nvPr/>
+        </p:nvSpPr>
+        <p:spPr>
+          <a:xfrm>
+            <a:off x="4120805" y="5249279"/>
+            <a:ext cx="3342640" cy="368300"/>
+          </a:xfrm>
+          <a:prstGeom prst="rect">
+            <a:avLst/>
+          </a:prstGeom>
+          <a:noFill/>
+        </p:spPr>
+        <p:txBody>
+          <a:bodyPr wrap="none" rtlCol="0">
+            <a:spAutoFit/>
+          </a:bodyPr>
+          <a:p>
+            <a:pPr algn="ctr"/>
+            <a:r>
+              <a:rPr kumimoji="1" lang="en-US" altLang="zh-CN" dirty="0" smtClean="0">
+                <a:latin typeface="微软雅黑 Light" panose="020B0502040204020203" pitchFamily="34" charset="-122"/>
+                <a:ea typeface="微软雅黑 Light" panose="020B0502040204020203" pitchFamily="34" charset="-122"/>
+                <a:cs typeface="微软雅黑 Light" panose="020B0502040204020203" pitchFamily="34" charset="-122"/>
+              </a:rPr>
+              <a:t>SE2020-G10-</a:t>
+            </a:r>
+            <a:r>
+              <a:rPr kumimoji="1" lang="zh-CN" dirty="0" smtClean="0">
+                <a:latin typeface="微软雅黑 Light" panose="020B0502040204020203" pitchFamily="34" charset="-122"/>
+                <a:ea typeface="微软雅黑 Light" panose="020B0502040204020203" pitchFamily="34" charset="-122"/>
+                <a:cs typeface="微软雅黑 Light" panose="020B0502040204020203" pitchFamily="34" charset="-122"/>
+              </a:rPr>
+              <a:t>软件需求规格说明</a:t>
+            </a:r>
+            <a:endParaRPr kumimoji="1" lang="zh-CN" dirty="0">
+              <a:latin typeface="微软雅黑 Light" panose="020B0502040204020203" pitchFamily="34" charset="-122"/>
+              <a:ea typeface="微软雅黑 Light" panose="020B0502040204020203" pitchFamily="34" charset="-122"/>
+              <a:cs typeface="微软雅黑 Light" panose="020B0502040204020203" pitchFamily="34" charset="-122"/>
+            </a:endParaRPr>
+          </a:p>
+        </p:txBody>
+      </p:sp>
+      <p:sp>
+        <p:nvSpPr>
+          <p:cNvPr id="20" name="文本框 19"/>
+          <p:cNvSpPr txBox="1"/>
+          <p:nvPr/>
+        </p:nvSpPr>
+        <p:spPr>
+          <a:xfrm>
+            <a:off x="5256820" y="5760255"/>
+            <a:ext cx="1195705" cy="368300"/>
+          </a:xfrm>
+          <a:prstGeom prst="rect">
+            <a:avLst/>
+          </a:prstGeom>
+          <a:noFill/>
+        </p:spPr>
+        <p:txBody>
+          <a:bodyPr wrap="none" rtlCol="0">
+            <a:spAutoFit/>
+          </a:bodyPr>
+          <a:p>
+            <a:r>
+              <a:rPr kumimoji="1" lang="en-US" altLang="zh-CN" dirty="0" smtClean="0">
+                <a:latin typeface="微软雅黑 Light" panose="020B0502040204020203" pitchFamily="34" charset="-122"/>
+                <a:ea typeface="微软雅黑 Light" panose="020B0502040204020203" pitchFamily="34" charset="-122"/>
+                <a:cs typeface="微软雅黑 Light" panose="020B0502040204020203" pitchFamily="34" charset="-122"/>
+              </a:rPr>
+              <a:t>2020.11.</a:t>
+            </a:r>
+            <a:r>
+              <a:rPr kumimoji="1" lang="en-US" dirty="0" smtClean="0">
+                <a:latin typeface="微软雅黑 Light" panose="020B0502040204020203" pitchFamily="34" charset="-122"/>
+                <a:ea typeface="微软雅黑 Light" panose="020B0502040204020203" pitchFamily="34" charset="-122"/>
+                <a:cs typeface="微软雅黑 Light" panose="020B0502040204020203" pitchFamily="34" charset="-122"/>
+              </a:rPr>
+              <a:t>14</a:t>
+            </a:r>
+            <a:endParaRPr kumimoji="1" lang="en-US" dirty="0">
+              <a:latin typeface="微软雅黑 Light" panose="020B0502040204020203" pitchFamily="34" charset="-122"/>
+              <a:ea typeface="微软雅黑 Light" panose="020B0502040204020203" pitchFamily="34" charset="-122"/>
+              <a:cs typeface="微软雅黑 Light" panose="020B0502040204020203" pitchFamily="34" charset="-122"/>
+            </a:endParaRPr>
+          </a:p>
+        </p:txBody>
+      </p:sp>
+      <p:grpSp>
+        <p:nvGrpSpPr>
+          <p:cNvPr id="21" name="组 5"/>
+          <p:cNvGrpSpPr/>
+          <p:nvPr/>
+        </p:nvGrpSpPr>
+        <p:grpSpPr>
+          <a:xfrm>
+            <a:off x="8310438" y="2787388"/>
+            <a:ext cx="2319215" cy="2319215"/>
+            <a:chOff x="2938584" y="2242373"/>
+            <a:chExt cx="2319215" cy="2319215"/>
+          </a:xfrm>
+        </p:grpSpPr>
+        <p:pic>
+          <p:nvPicPr>
+            <p:cNvPr id="22" name="图片 3">
+              <a:hlinkClick r:id="rId4" action="ppaction://hlinkfile"/>
+            </p:cNvPr>
+            <p:cNvPicPr>
+              <a:picLocks noChangeAspect="1"/>
+            </p:cNvPicPr>
+            <p:nvPr/>
+          </p:nvPicPr>
+          <p:blipFill>
+            <a:blip r:embed="rId5" cstate="print">
+              <a:extLst>
+                <a:ext uri="{28A0092B-C50C-407E-A947-70E740481C1C}">
+                  <a14:useLocalDpi xmlns:a14="http://schemas.microsoft.com/office/drawing/2010/main" val="0"/>
+                </a:ext>
+              </a:extLst>
+            </a:blip>
+            <a:stretch>
+              <a:fillRect/>
+            </a:stretch>
+          </p:blipFill>
+          <p:spPr>
+            <a:xfrm>
+              <a:off x="2938584" y="2242373"/>
+              <a:ext cx="2319215" cy="2319215"/>
+            </a:xfrm>
+            <a:prstGeom prst="rect">
+              <a:avLst/>
+            </a:prstGeom>
+          </p:spPr>
+        </p:pic>
+        <p:sp>
+          <p:nvSpPr>
+            <p:cNvPr id="23" name="文本框 4"/>
+            <p:cNvSpPr txBox="1"/>
+            <p:nvPr/>
+          </p:nvSpPr>
+          <p:spPr>
+            <a:xfrm>
+              <a:off x="3816097" y="2727435"/>
+              <a:ext cx="652145" cy="521970"/>
+            </a:xfrm>
+            <a:prstGeom prst="rect">
+              <a:avLst/>
+            </a:prstGeom>
+            <a:noFill/>
+          </p:spPr>
+          <p:txBody>
+            <a:bodyPr wrap="none" rtlCol="0">
+              <a:spAutoFit/>
+            </a:bodyPr>
+            <a:lstStyle/>
+            <a:p>
+              <a:r>
+                <a:rPr kumimoji="1" lang="en-US" altLang="zh-CN" sz="1400" dirty="0">
+                  <a:latin typeface="微软雅黑 Light" panose="020B0502040204020203" pitchFamily="34" charset="-122"/>
+                  <a:ea typeface="微软雅黑 Light" panose="020B0502040204020203" pitchFamily="34" charset="-122"/>
+                  <a:cs typeface="微软雅黑 Light" panose="020B0502040204020203" pitchFamily="34" charset="-122"/>
+                </a:rPr>
+                <a:t> SRS</a:t>
+              </a:r>
+              <a:endParaRPr kumimoji="1" lang="en-US" altLang="zh-CN" sz="1400" dirty="0">
+                <a:latin typeface="微软雅黑 Light" panose="020B0502040204020203" pitchFamily="34" charset="-122"/>
+                <a:ea typeface="微软雅黑 Light" panose="020B0502040204020203" pitchFamily="34" charset="-122"/>
+                <a:cs typeface="微软雅黑 Light" panose="020B0502040204020203" pitchFamily="34" charset="-122"/>
+              </a:endParaRPr>
+            </a:p>
+            <a:p>
+              <a:r>
+                <a:rPr kumimoji="1" lang="en-US" altLang="zh-CN" sz="1400" dirty="0">
+                  <a:latin typeface="微软雅黑 Light" panose="020B0502040204020203" pitchFamily="34" charset="-122"/>
+                  <a:ea typeface="微软雅黑 Light" panose="020B0502040204020203" pitchFamily="34" charset="-122"/>
+                  <a:cs typeface="微软雅黑 Light" panose="020B0502040204020203" pitchFamily="34" charset="-122"/>
+                </a:rPr>
+                <a:t>v0.0.3</a:t>
+              </a:r>
+              <a:endParaRPr kumimoji="1" lang="en-US" altLang="zh-CN" sz="1400" dirty="0">
+                <a:latin typeface="微软雅黑 Light" panose="020B0502040204020203" pitchFamily="34" charset="-122"/>
+                <a:ea typeface="微软雅黑 Light" panose="020B0502040204020203" pitchFamily="34" charset="-122"/>
+                <a:cs typeface="微软雅黑 Light" panose="020B0502040204020203" pitchFamily="34" charset="-122"/>
+              </a:endParaRPr>
+            </a:p>
+          </p:txBody>
+        </p:sp>
+      </p:grpSp>
+      <p:sp>
+        <p:nvSpPr>
+          <p:cNvPr id="24" name="文本框 6"/>
+          <p:cNvSpPr txBox="1"/>
+          <p:nvPr/>
+        </p:nvSpPr>
+        <p:spPr>
+          <a:xfrm>
+            <a:off x="7736495" y="5249279"/>
+            <a:ext cx="3342640" cy="368300"/>
+          </a:xfrm>
+          <a:prstGeom prst="rect">
+            <a:avLst/>
+          </a:prstGeom>
+          <a:noFill/>
+        </p:spPr>
+        <p:txBody>
+          <a:bodyPr wrap="none" rtlCol="0">
+            <a:spAutoFit/>
+          </a:bodyPr>
+          <a:lstStyle/>
+          <a:p>
+            <a:pPr algn="ctr"/>
+            <a:r>
+              <a:rPr kumimoji="1" lang="en-US" altLang="zh-CN" dirty="0" smtClean="0">
+                <a:latin typeface="微软雅黑 Light" panose="020B0502040204020203" pitchFamily="34" charset="-122"/>
+                <a:ea typeface="微软雅黑 Light" panose="020B0502040204020203" pitchFamily="34" charset="-122"/>
+                <a:cs typeface="微软雅黑 Light" panose="020B0502040204020203" pitchFamily="34" charset="-122"/>
+              </a:rPr>
+              <a:t>SE2020-G10-</a:t>
+            </a:r>
+            <a:r>
+              <a:rPr kumimoji="1" lang="zh-CN" dirty="0" smtClean="0">
+                <a:latin typeface="微软雅黑 Light" panose="020B0502040204020203" pitchFamily="34" charset="-122"/>
+                <a:ea typeface="微软雅黑 Light" panose="020B0502040204020203" pitchFamily="34" charset="-122"/>
+                <a:cs typeface="微软雅黑 Light" panose="020B0502040204020203" pitchFamily="34" charset="-122"/>
+              </a:rPr>
+              <a:t>软件需求规格说明</a:t>
+            </a:r>
+            <a:endParaRPr kumimoji="1" lang="zh-CN" dirty="0">
+              <a:latin typeface="微软雅黑 Light" panose="020B0502040204020203" pitchFamily="34" charset="-122"/>
+              <a:ea typeface="微软雅黑 Light" panose="020B0502040204020203" pitchFamily="34" charset="-122"/>
+              <a:cs typeface="微软雅黑 Light" panose="020B0502040204020203" pitchFamily="34" charset="-122"/>
+            </a:endParaRPr>
+          </a:p>
+        </p:txBody>
+      </p:sp>
+      <p:sp>
+        <p:nvSpPr>
+          <p:cNvPr id="25" name="文本框 24"/>
+          <p:cNvSpPr txBox="1"/>
+          <p:nvPr/>
+        </p:nvSpPr>
+        <p:spPr>
+          <a:xfrm>
+            <a:off x="8854730" y="5760255"/>
+            <a:ext cx="1191895" cy="368300"/>
+          </a:xfrm>
+          <a:prstGeom prst="rect">
+            <a:avLst/>
+          </a:prstGeom>
+          <a:noFill/>
+        </p:spPr>
+        <p:txBody>
+          <a:bodyPr wrap="none" rtlCol="0">
+            <a:spAutoFit/>
+          </a:bodyPr>
+          <a:lstStyle/>
+          <a:p>
+            <a:r>
+              <a:rPr kumimoji="1" lang="en-US" altLang="zh-CN" dirty="0" smtClean="0">
+                <a:latin typeface="微软雅黑 Light" panose="020B0502040204020203" pitchFamily="34" charset="-122"/>
+                <a:ea typeface="微软雅黑 Light" panose="020B0502040204020203" pitchFamily="34" charset="-122"/>
+                <a:cs typeface="微软雅黑 Light" panose="020B0502040204020203" pitchFamily="34" charset="-122"/>
+              </a:rPr>
+              <a:t>2020.11.</a:t>
+            </a:r>
+            <a:r>
+              <a:rPr kumimoji="1" lang="en-US" dirty="0" smtClean="0">
+                <a:latin typeface="微软雅黑 Light" panose="020B0502040204020203" pitchFamily="34" charset="-122"/>
+                <a:ea typeface="微软雅黑 Light" panose="020B0502040204020203" pitchFamily="34" charset="-122"/>
+                <a:cs typeface="微软雅黑 Light" panose="020B0502040204020203" pitchFamily="34" charset="-122"/>
+              </a:rPr>
+              <a:t>15</a:t>
+            </a:r>
+            <a:endParaRPr kumimoji="1" lang="en-US" dirty="0">
               <a:latin typeface="微软雅黑 Light" panose="020B0502040204020203" pitchFamily="34" charset="-122"/>
               <a:ea typeface="微软雅黑 Light" panose="020B0502040204020203" pitchFamily="34" charset="-122"/>
               <a:cs typeface="微软雅黑 Light" panose="020B0502040204020203" pitchFamily="34" charset="-122"/>
@@ -13283,7 +13619,7 @@
       </p:sp>
       <p:pic>
         <p:nvPicPr>
-          <p:cNvPr id="-2147482620" name="图片 -2147482621"/>
+          <p:cNvPr id="3" name="图片 -2147482621"/>
           <p:cNvPicPr>
             <a:picLocks noChangeAspect="1"/>
           </p:cNvPicPr>
@@ -13608,7 +13944,7 @@
         <p:spPr>
           <a:xfrm>
             <a:off x="1452880" y="1552414"/>
-            <a:ext cx="9024264" cy="400110"/>
+            <a:ext cx="9024264" cy="398780"/>
           </a:xfrm>
           <a:prstGeom prst="rect">
             <a:avLst/>
@@ -13626,7 +13962,7 @@
                 <a:ea typeface="+mj-ea"/>
                 <a:cs typeface="微软雅黑" panose="020B0503020204020204" charset="-122"/>
               </a:rPr>
-              <a:t>项目近期具体分工</a:t>
+              <a:t>近期具体分工</a:t>
             </a:r>
             <a:endParaRPr kumimoji="1" lang="zh-CN" altLang="en-US" sz="2000" b="1" dirty="0">
               <a:latin typeface="+mj-ea"/>
@@ -13638,7 +13974,7 @@
       </p:sp>
       <p:pic>
         <p:nvPicPr>
-          <p:cNvPr id="4" name="图片 3"/>
+          <p:cNvPr id="3" name="图片 2"/>
           <p:cNvPicPr>
             <a:picLocks noChangeAspect="1"/>
           </p:cNvPicPr>
@@ -13652,8 +13988,8 @@
         </p:blipFill>
         <p:spPr>
           <a:xfrm>
-            <a:off x="1452879" y="2286372"/>
-            <a:ext cx="6813905" cy="4182793"/>
+            <a:off x="1536700" y="2303780"/>
+            <a:ext cx="6693535" cy="3951605"/>
           </a:xfrm>
           <a:prstGeom prst="rect">
             <a:avLst/>
@@ -13959,7 +14295,7 @@
         <p:spPr>
           <a:xfrm>
             <a:off x="950814" y="2006028"/>
-            <a:ext cx="4804012" cy="369332"/>
+            <a:ext cx="4804012" cy="368300"/>
           </a:xfrm>
           <a:prstGeom prst="rect">
             <a:avLst/>
@@ -13974,7 +14310,7 @@
           <a:p>
             <a:r>
               <a:rPr lang="zh-CN" altLang="en-US" dirty="0"/>
-              <a:t>每次开会均有电子文档保存并当晚上传至</a:t>
+              <a:t>每次开会均有电子文档保存并上传至</a:t>
             </a:r>
             <a:r>
               <a:rPr lang="en-US" altLang="zh-CN" dirty="0" err="1"/>
@@ -13986,7 +14322,7 @@
       </p:sp>
       <p:pic>
         <p:nvPicPr>
-          <p:cNvPr id="4" name="图片 3"/>
+          <p:cNvPr id="3" name="图片 2"/>
           <p:cNvPicPr>
             <a:picLocks noChangeAspect="1"/>
           </p:cNvPicPr>
@@ -14000,41 +14336,86 @@
         </p:blipFill>
         <p:spPr>
           <a:xfrm>
-            <a:off x="950814" y="2931520"/>
-            <a:ext cx="4665291" cy="3048526"/>
+            <a:off x="6831965" y="382905"/>
+            <a:ext cx="4223385" cy="5761990"/>
           </a:xfrm>
           <a:prstGeom prst="rect">
             <a:avLst/>
           </a:prstGeom>
         </p:spPr>
       </p:pic>
-      <p:pic>
-        <p:nvPicPr>
-          <p:cNvPr id="9" name="图片 8">
+      <p:sp>
+        <p:nvSpPr>
+          <p:cNvPr id="10" name="文本框 9">
             <a:hlinkClick r:id="rId5" action="ppaction://hlinkfile"/>
           </p:cNvPr>
-          <p:cNvPicPr>
-            <a:picLocks noChangeAspect="1"/>
-          </p:cNvPicPr>
+          <p:cNvSpPr txBox="1"/>
           <p:nvPr/>
-        </p:nvPicPr>
-        <p:blipFill>
-          <a:blip r:embed="rId6"/>
-          <a:srcRect l="2178" t="984"/>
-          <a:stretch>
-            <a:fillRect/>
-          </a:stretch>
-        </p:blipFill>
-        <p:spPr>
-          <a:xfrm>
-            <a:off x="6642735" y="397510"/>
-            <a:ext cx="4661535" cy="6063615"/>
+        </p:nvSpPr>
+        <p:spPr>
+          <a:xfrm>
+            <a:off x="1526540" y="3007995"/>
+            <a:ext cx="3215640" cy="368300"/>
           </a:xfrm>
           <a:prstGeom prst="rect">
             <a:avLst/>
           </a:prstGeom>
-        </p:spPr>
-      </p:pic>
+          <a:noFill/>
+        </p:spPr>
+        <p:txBody>
+          <a:bodyPr wrap="none" rtlCol="0">
+            <a:spAutoFit/>
+          </a:bodyPr>
+          <a:p>
+            <a:pPr algn="l"/>
+            <a:r>
+              <a:rPr lang="zh-CN" altLang="en-US"/>
+              <a:t>SE2020-G10-20201113会议记录</a:t>
+            </a:r>
+            <a:endParaRPr lang="zh-CN" altLang="en-US"/>
+          </a:p>
+        </p:txBody>
+      </p:sp>
+      <p:sp>
+        <p:nvSpPr>
+          <p:cNvPr id="11" name="文本框 10"/>
+          <p:cNvSpPr txBox="1"/>
+          <p:nvPr/>
+        </p:nvSpPr>
+        <p:spPr>
+          <a:xfrm>
+            <a:off x="1526540" y="3580765"/>
+            <a:ext cx="3215640" cy="368300"/>
+          </a:xfrm>
+          <a:prstGeom prst="rect">
+            <a:avLst/>
+          </a:prstGeom>
+          <a:noFill/>
+        </p:spPr>
+        <p:txBody>
+          <a:bodyPr wrap="none" rtlCol="0">
+            <a:spAutoFit/>
+          </a:bodyPr>
+          <a:p>
+            <a:pPr algn="l"/>
+            <a:r>
+              <a:rPr lang="zh-CN" altLang="en-US"/>
+              <a:t>SE2020-G10</a:t>
+            </a:r>
+            <a:r>
+              <a:rPr lang="zh-CN" altLang="en-US">
+                <a:hlinkClick r:id="rId6" action="ppaction://hlinkfile"/>
+              </a:rPr>
+              <a:t>-</a:t>
+            </a:r>
+            <a:r>
+              <a:rPr lang="zh-CN" altLang="en-US"/>
+              <a:t>20201115会议记录</a:t>
+            </a:r>
+            <a:endParaRPr lang="zh-CN" altLang="en-US"/>
+          </a:p>
+        </p:txBody>
+      </p:sp>
     </p:spTree>
     <p:custDataLst>
       <p:tags r:id="rId7"/>
@@ -14327,7 +14708,7 @@
       </p:sp>
       <p:pic>
         <p:nvPicPr>
-          <p:cNvPr id="3" name="图片 2"/>
+          <p:cNvPr id="4" name="图片 3"/>
           <p:cNvPicPr>
             <a:picLocks noChangeAspect="1"/>
           </p:cNvPicPr>
@@ -14341,8 +14722,8 @@
         </p:blipFill>
         <p:spPr>
           <a:xfrm>
-            <a:off x="535940" y="1569085"/>
-            <a:ext cx="11298555" cy="3719830"/>
+            <a:off x="479425" y="1819275"/>
+            <a:ext cx="11233150" cy="3533140"/>
           </a:xfrm>
           <a:prstGeom prst="rect">
             <a:avLst/>
@@ -14653,149 +15034,665 @@
           </a:p>
         </p:txBody>
       </p:sp>
-      <p:sp>
-        <p:nvSpPr>
-          <p:cNvPr id="4" name="文本框 3"/>
-          <p:cNvSpPr txBox="1"/>
-          <p:nvPr/>
-        </p:nvSpPr>
-        <p:spPr>
-          <a:xfrm>
-            <a:off x="881698" y="1714500"/>
-            <a:ext cx="10928350" cy="4524315"/>
-          </a:xfrm>
-          <a:prstGeom prst="rect">
-            <a:avLst/>
-          </a:prstGeom>
-          <a:noFill/>
-        </p:spPr>
-        <p:txBody>
-          <a:bodyPr wrap="square" rtlCol="0">
-            <a:spAutoFit/>
-          </a:bodyPr>
-          <a:lstStyle/>
-          <a:p>
-            <a:pPr fontAlgn="auto">
-              <a:lnSpc>
-                <a:spcPct val="150000"/>
-              </a:lnSpc>
-            </a:pPr>
-            <a:r>
-              <a:rPr lang="zh-CN" altLang="en-US" sz="2400" dirty="0"/>
-              <a:t>[1]陈新博,段飞志.基于B/S架构下的慕课平台设计与实现[J].数码世界,2020(09):256-258.</a:t>
-            </a:r>
-            <a:endParaRPr lang="zh-CN" altLang="en-US" sz="2400" dirty="0"/>
-          </a:p>
-          <a:p>
-            <a:pPr fontAlgn="auto">
-              <a:lnSpc>
-                <a:spcPct val="150000"/>
-              </a:lnSpc>
-            </a:pPr>
-            <a:r>
-              <a:rPr lang="zh-CN" altLang="en-US" sz="2400" dirty="0"/>
-              <a:t>[</a:t>
-            </a:r>
-            <a:r>
-              <a:rPr lang="en-US" altLang="zh-CN" sz="2400" dirty="0"/>
-              <a:t>2</a:t>
-            </a:r>
-            <a:r>
-              <a:rPr lang="zh-CN" altLang="en-US" sz="2400" dirty="0"/>
-              <a:t>]耿庆阳. 基于Spring Boot与Vue的电子商城设计与实现[D].西安石油大学,2020.</a:t>
-            </a:r>
-            <a:endParaRPr lang="zh-CN" altLang="en-US" sz="2400" dirty="0"/>
-          </a:p>
-          <a:p>
-            <a:pPr fontAlgn="auto">
-              <a:lnSpc>
-                <a:spcPct val="150000"/>
-              </a:lnSpc>
-            </a:pPr>
-            <a:r>
-              <a:rPr lang="en-US" altLang="zh-CN" sz="2400" dirty="0"/>
-              <a:t>[3]</a:t>
-            </a:r>
-            <a:r>
-              <a:rPr lang="zh-CN" altLang="en-US" sz="2400" dirty="0"/>
-              <a:t>豆瓣网站 </a:t>
-            </a:r>
-            <a:r>
-              <a:rPr lang="zh-CN" altLang="en-US" sz="2400" dirty="0">
-                <a:hlinkClick r:id="rId4"/>
-              </a:rPr>
-              <a:t>https://book.douban.com</a:t>
-            </a:r>
-            <a:r>
-              <a:rPr lang="zh-CN" altLang="en-US" sz="2400" dirty="0" smtClean="0">
-                <a:hlinkClick r:id="rId4"/>
-              </a:rPr>
-              <a:t>/</a:t>
-            </a:r>
-            <a:endParaRPr lang="en-US" altLang="zh-CN" sz="2400" dirty="0" smtClean="0"/>
-          </a:p>
-          <a:p>
-            <a:pPr fontAlgn="auto">
-              <a:lnSpc>
-                <a:spcPct val="150000"/>
-              </a:lnSpc>
-            </a:pPr>
-            <a:r>
-              <a:rPr lang="en-US" altLang="zh-CN" sz="2400" dirty="0" smtClean="0"/>
-              <a:t>[4]</a:t>
-            </a:r>
-            <a:r>
-              <a:rPr lang="zh-CN" altLang="en-US" sz="2400" dirty="0"/>
-              <a:t>陈豪</a:t>
-            </a:r>
-            <a:r>
-              <a:rPr lang="en-US" altLang="zh-CN" sz="2400" dirty="0"/>
-              <a:t>. </a:t>
-            </a:r>
-            <a:r>
-              <a:rPr lang="zh-CN" altLang="en-US" sz="2400" dirty="0"/>
-              <a:t>个性化推荐方法在高校图书馆书目推荐中的应用研究</a:t>
-            </a:r>
-            <a:r>
-              <a:rPr lang="en-US" altLang="zh-CN" sz="2400" dirty="0"/>
-              <a:t>[D].</a:t>
-            </a:r>
-            <a:r>
-              <a:rPr lang="zh-CN" altLang="en-US" sz="2400" dirty="0"/>
-              <a:t>贵州财经大学</a:t>
-            </a:r>
-            <a:r>
-              <a:rPr lang="en-US" altLang="zh-CN" sz="2400" dirty="0"/>
-              <a:t>,2019</a:t>
-            </a:r>
-            <a:r>
-              <a:rPr lang="en-US" altLang="zh-CN" sz="2400" dirty="0" smtClean="0"/>
-              <a:t>.</a:t>
-            </a:r>
-            <a:endParaRPr lang="en-US" altLang="zh-CN" sz="2400" dirty="0" smtClean="0"/>
-          </a:p>
-          <a:p>
-            <a:pPr fontAlgn="auto">
-              <a:lnSpc>
-                <a:spcPct val="150000"/>
-              </a:lnSpc>
-            </a:pPr>
-            <a:r>
-              <a:rPr lang="en-US" altLang="zh-CN" sz="2400" dirty="0" smtClean="0"/>
-              <a:t>[</a:t>
-            </a:r>
-            <a:r>
-              <a:rPr lang="en-US" altLang="zh-CN" sz="2400" dirty="0"/>
-              <a:t>5] 《Project Management Body Of </a:t>
-            </a:r>
-            <a:r>
-              <a:rPr lang="en-US" altLang="zh-CN" sz="2400" dirty="0" smtClean="0"/>
-              <a:t>Knowledge》P158,P159</a:t>
-            </a:r>
-            <a:endParaRPr lang="en-US" altLang="zh-CN" sz="2400" dirty="0" smtClean="0"/>
-          </a:p>
-        </p:txBody>
-      </p:sp>
+      <p:graphicFrame>
+        <p:nvGraphicFramePr>
+          <p:cNvPr id="3" name="表格 2"/>
+          <p:cNvGraphicFramePr>
+            <a:graphicFrameLocks noGrp="1"/>
+          </p:cNvGraphicFramePr>
+          <p:nvPr>
+            <p:custDataLst>
+              <p:tags r:id="rId4"/>
+            </p:custDataLst>
+          </p:nvPr>
+        </p:nvGraphicFramePr>
+        <p:xfrm>
+          <a:off x="668402" y="2007978"/>
+          <a:ext cx="11109325" cy="2106295"/>
+        </p:xfrm>
+        <a:graphic>
+          <a:graphicData uri="http://schemas.openxmlformats.org/drawingml/2006/table">
+            <a:tbl>
+              <a:tblPr firstRow="1" firstCol="1" bandRow="1"/>
+              <a:tblGrid>
+                <a:gridCol w="2085975"/>
+                <a:gridCol w="5816600"/>
+                <a:gridCol w="1646555"/>
+                <a:gridCol w="1560195"/>
+              </a:tblGrid>
+              <a:tr h="1103630">
+                <a:tc>
+                  <a:txBody>
+                    <a:bodyPr/>
+                    <a:p>
+                      <a:pPr algn="just">
+                        <a:spcAft>
+                          <a:spcPts val="0"/>
+                        </a:spcAft>
+                      </a:pPr>
+                      <a:r>
+                        <a:rPr lang="en-US" sz="1600" b="0" i="0" kern="100">
+                          <a:effectLst/>
+                          <a:latin typeface="微软雅黑" panose="020B0503020204020204" charset="-122"/>
+                          <a:ea typeface="微软雅黑" panose="020B0503020204020204" charset="-122"/>
+                          <a:cs typeface="微软雅黑" panose="020B0503020204020204" charset="-122"/>
+                        </a:rPr>
+                        <a:t>ICS 35.080 L77</a:t>
+                      </a:r>
+                      <a:endParaRPr lang="zh-CN" sz="1600" b="0" i="0" kern="100">
+                        <a:effectLst/>
+                        <a:latin typeface="微软雅黑" panose="020B0503020204020204" charset="-122"/>
+                        <a:ea typeface="微软雅黑" panose="020B0503020204020204" charset="-122"/>
+                        <a:cs typeface="微软雅黑" panose="020B0503020204020204" charset="-122"/>
+                      </a:endParaRPr>
+                    </a:p>
+                  </a:txBody>
+                  <a:tcPr marL="68580" marR="68580" marT="0" marB="0">
+                    <a:lnL w="12700" cap="flat" cmpd="sng" algn="ctr">
+                      <a:solidFill>
+                        <a:srgbClr val="000000"/>
+                      </a:solidFill>
+                      <a:prstDash val="solid"/>
+                      <a:round/>
+                      <a:headEnd type="none" w="med" len="med"/>
+                      <a:tailEnd type="none" w="med" len="med"/>
+                    </a:lnL>
+                    <a:lnR w="12700" cap="flat" cmpd="sng" algn="ctr">
+                      <a:solidFill>
+                        <a:srgbClr val="000000"/>
+                      </a:solidFill>
+                      <a:prstDash val="solid"/>
+                      <a:round/>
+                      <a:headEnd type="none" w="med" len="med"/>
+                      <a:tailEnd type="none" w="med" len="med"/>
+                    </a:lnR>
+                    <a:lnT w="12700" cap="flat" cmpd="sng" algn="ctr">
+                      <a:solidFill>
+                        <a:srgbClr val="000000"/>
+                      </a:solidFill>
+                      <a:prstDash val="solid"/>
+                      <a:round/>
+                      <a:headEnd type="none" w="med" len="med"/>
+                      <a:tailEnd type="none" w="med" len="med"/>
+                    </a:lnT>
+                    <a:lnB w="12700" cap="flat" cmpd="sng" algn="ctr">
+                      <a:solidFill>
+                        <a:srgbClr val="000000"/>
+                      </a:solidFill>
+                      <a:prstDash val="solid"/>
+                      <a:round/>
+                      <a:headEnd type="none" w="med" len="med"/>
+                      <a:tailEnd type="none" w="med" len="med"/>
+                    </a:lnB>
+                    <a:solidFill>
+                      <a:srgbClr val="FFFFFF"/>
+                    </a:solidFill>
+                  </a:tcPr>
+                </a:tc>
+                <a:tc>
+                  <a:txBody>
+                    <a:bodyPr/>
+                    <a:p>
+                      <a:pPr algn="just">
+                        <a:spcAft>
+                          <a:spcPts val="0"/>
+                        </a:spcAft>
+                      </a:pPr>
+                      <a:r>
+                        <a:rPr lang="zh-CN" sz="1600" b="0" i="0" kern="100">
+                          <a:effectLst/>
+                          <a:latin typeface="微软雅黑" panose="020B0503020204020204" charset="-122"/>
+                          <a:ea typeface="微软雅黑" panose="020B0503020204020204" charset="-122"/>
+                          <a:cs typeface="微软雅黑" panose="020B0503020204020204" charset="-122"/>
+                        </a:rPr>
+                        <a:t>《中华人民共和国国家标准</a:t>
+                      </a:r>
+                      <a:r>
+                        <a:rPr lang="en-US" sz="1600" b="0" i="0" kern="100">
+                          <a:effectLst/>
+                          <a:latin typeface="微软雅黑" panose="020B0503020204020204" charset="-122"/>
+                          <a:ea typeface="微软雅黑" panose="020B0503020204020204" charset="-122"/>
+                          <a:cs typeface="微软雅黑" panose="020B0503020204020204" charset="-122"/>
+                        </a:rPr>
+                        <a:t>-</a:t>
+                      </a:r>
+                      <a:r>
+                        <a:rPr lang="zh-CN" sz="1600" b="0" i="0" kern="100">
+                          <a:effectLst/>
+                          <a:latin typeface="微软雅黑" panose="020B0503020204020204" charset="-122"/>
+                          <a:ea typeface="微软雅黑" panose="020B0503020204020204" charset="-122"/>
+                          <a:cs typeface="微软雅黑" panose="020B0503020204020204" charset="-122"/>
+                        </a:rPr>
+                        <a:t>计算机软件文档编制规范》</a:t>
+                      </a:r>
+                      <a:endParaRPr lang="zh-CN" sz="1600" b="0" i="0" kern="100">
+                        <a:effectLst/>
+                        <a:latin typeface="微软雅黑" panose="020B0503020204020204" charset="-122"/>
+                        <a:ea typeface="微软雅黑" panose="020B0503020204020204" charset="-122"/>
+                        <a:cs typeface="微软雅黑" panose="020B0503020204020204" charset="-122"/>
+                      </a:endParaRPr>
+                    </a:p>
+                  </a:txBody>
+                  <a:tcPr marL="68580" marR="68580" marT="0" marB="0">
+                    <a:lnL w="12700" cap="flat" cmpd="sng" algn="ctr">
+                      <a:solidFill>
+                        <a:srgbClr val="000000"/>
+                      </a:solidFill>
+                      <a:prstDash val="solid"/>
+                      <a:round/>
+                      <a:headEnd type="none" w="med" len="med"/>
+                      <a:tailEnd type="none" w="med" len="med"/>
+                    </a:lnL>
+                    <a:lnR w="12700" cap="flat" cmpd="sng" algn="ctr">
+                      <a:solidFill>
+                        <a:srgbClr val="000000"/>
+                      </a:solidFill>
+                      <a:prstDash val="solid"/>
+                      <a:round/>
+                      <a:headEnd type="none" w="med" len="med"/>
+                      <a:tailEnd type="none" w="med" len="med"/>
+                    </a:lnR>
+                    <a:lnT w="12700" cap="flat" cmpd="sng" algn="ctr">
+                      <a:solidFill>
+                        <a:srgbClr val="000000"/>
+                      </a:solidFill>
+                      <a:prstDash val="solid"/>
+                      <a:round/>
+                      <a:headEnd type="none" w="med" len="med"/>
+                      <a:tailEnd type="none" w="med" len="med"/>
+                    </a:lnT>
+                    <a:lnB w="12700" cap="flat" cmpd="sng" algn="ctr">
+                      <a:solidFill>
+                        <a:srgbClr val="000000"/>
+                      </a:solidFill>
+                      <a:prstDash val="solid"/>
+                      <a:round/>
+                      <a:headEnd type="none" w="med" len="med"/>
+                      <a:tailEnd type="none" w="med" len="med"/>
+                    </a:lnB>
+                    <a:solidFill>
+                      <a:srgbClr val="FFFFFF"/>
+                    </a:solidFill>
+                  </a:tcPr>
+                </a:tc>
+                <a:tc>
+                  <a:txBody>
+                    <a:bodyPr/>
+                    <a:p>
+                      <a:pPr algn="just">
+                        <a:spcAft>
+                          <a:spcPts val="0"/>
+                        </a:spcAft>
+                      </a:pPr>
+                      <a:r>
+                        <a:rPr lang="en-US" sz="1600" b="0" i="0" kern="100">
+                          <a:effectLst/>
+                          <a:latin typeface="微软雅黑" panose="020B0503020204020204" charset="-122"/>
+                          <a:ea typeface="微软雅黑" panose="020B0503020204020204" charset="-122"/>
+                          <a:cs typeface="微软雅黑" panose="020B0503020204020204" charset="-122"/>
+                        </a:rPr>
+                        <a:t>GB/T 8567-2006</a:t>
+                      </a:r>
+                      <a:endParaRPr lang="zh-CN" sz="1600" b="0" i="0" kern="100">
+                        <a:effectLst/>
+                        <a:latin typeface="微软雅黑" panose="020B0503020204020204" charset="-122"/>
+                        <a:ea typeface="微软雅黑" panose="020B0503020204020204" charset="-122"/>
+                        <a:cs typeface="微软雅黑" panose="020B0503020204020204" charset="-122"/>
+                      </a:endParaRPr>
+                    </a:p>
+                  </a:txBody>
+                  <a:tcPr marL="68580" marR="68580" marT="0" marB="0">
+                    <a:lnL w="12700" cap="flat" cmpd="sng" algn="ctr">
+                      <a:solidFill>
+                        <a:srgbClr val="000000"/>
+                      </a:solidFill>
+                      <a:prstDash val="solid"/>
+                      <a:round/>
+                      <a:headEnd type="none" w="med" len="med"/>
+                      <a:tailEnd type="none" w="med" len="med"/>
+                    </a:lnL>
+                    <a:lnR w="12700" cap="flat" cmpd="sng" algn="ctr">
+                      <a:solidFill>
+                        <a:srgbClr val="000000"/>
+                      </a:solidFill>
+                      <a:prstDash val="solid"/>
+                      <a:round/>
+                      <a:headEnd type="none" w="med" len="med"/>
+                      <a:tailEnd type="none" w="med" len="med"/>
+                    </a:lnR>
+                    <a:lnT w="12700" cap="flat" cmpd="sng" algn="ctr">
+                      <a:solidFill>
+                        <a:srgbClr val="000000"/>
+                      </a:solidFill>
+                      <a:prstDash val="solid"/>
+                      <a:round/>
+                      <a:headEnd type="none" w="med" len="med"/>
+                      <a:tailEnd type="none" w="med" len="med"/>
+                    </a:lnT>
+                    <a:lnB w="12700" cap="flat" cmpd="sng" algn="ctr">
+                      <a:solidFill>
+                        <a:srgbClr val="000000"/>
+                      </a:solidFill>
+                      <a:prstDash val="solid"/>
+                      <a:round/>
+                      <a:headEnd type="none" w="med" len="med"/>
+                      <a:tailEnd type="none" w="med" len="med"/>
+                    </a:lnB>
+                    <a:solidFill>
+                      <a:srgbClr val="FFFFFF"/>
+                    </a:solidFill>
+                  </a:tcPr>
+                </a:tc>
+                <a:tc>
+                  <a:txBody>
+                    <a:bodyPr/>
+                    <a:p>
+                      <a:pPr algn="just">
+                        <a:spcAft>
+                          <a:spcPts val="0"/>
+                        </a:spcAft>
+                      </a:pPr>
+                      <a:r>
+                        <a:rPr lang="en-US" sz="1600" b="0" i="0" kern="100">
+                          <a:effectLst/>
+                          <a:latin typeface="微软雅黑" panose="020B0503020204020204" charset="-122"/>
+                          <a:ea typeface="微软雅黑" panose="020B0503020204020204" charset="-122"/>
+                          <a:cs typeface="微软雅黑" panose="020B0503020204020204" charset="-122"/>
+                        </a:rPr>
+                        <a:t>2006-03-14</a:t>
+                      </a:r>
+                      <a:endParaRPr lang="zh-CN" sz="1600" b="0" i="0" kern="100">
+                        <a:effectLst/>
+                        <a:latin typeface="微软雅黑" panose="020B0503020204020204" charset="-122"/>
+                        <a:ea typeface="微软雅黑" panose="020B0503020204020204" charset="-122"/>
+                        <a:cs typeface="微软雅黑" panose="020B0503020204020204" charset="-122"/>
+                      </a:endParaRPr>
+                    </a:p>
+                  </a:txBody>
+                  <a:tcPr marL="68580" marR="68580" marT="0" marB="0">
+                    <a:lnL w="12700" cap="flat" cmpd="sng" algn="ctr">
+                      <a:solidFill>
+                        <a:srgbClr val="000000"/>
+                      </a:solidFill>
+                      <a:prstDash val="solid"/>
+                      <a:round/>
+                      <a:headEnd type="none" w="med" len="med"/>
+                      <a:tailEnd type="none" w="med" len="med"/>
+                    </a:lnL>
+                    <a:lnR w="12700" cap="flat" cmpd="sng" algn="ctr">
+                      <a:solidFill>
+                        <a:srgbClr val="000000"/>
+                      </a:solidFill>
+                      <a:prstDash val="solid"/>
+                      <a:round/>
+                      <a:headEnd type="none" w="med" len="med"/>
+                      <a:tailEnd type="none" w="med" len="med"/>
+                    </a:lnR>
+                    <a:lnT w="12700" cap="flat" cmpd="sng" algn="ctr">
+                      <a:solidFill>
+                        <a:srgbClr val="000000"/>
+                      </a:solidFill>
+                      <a:prstDash val="solid"/>
+                      <a:round/>
+                      <a:headEnd type="none" w="med" len="med"/>
+                      <a:tailEnd type="none" w="med" len="med"/>
+                    </a:lnT>
+                    <a:lnB w="12700" cap="flat" cmpd="sng" algn="ctr">
+                      <a:solidFill>
+                        <a:srgbClr val="000000"/>
+                      </a:solidFill>
+                      <a:prstDash val="solid"/>
+                      <a:round/>
+                      <a:headEnd type="none" w="med" len="med"/>
+                      <a:tailEnd type="none" w="med" len="med"/>
+                    </a:lnB>
+                    <a:solidFill>
+                      <a:srgbClr val="FFFFFF"/>
+                    </a:solidFill>
+                  </a:tcPr>
+                </a:tc>
+              </a:tr>
+              <a:tr h="1002665">
+                <a:tc>
+                  <a:txBody>
+                    <a:bodyPr/>
+                    <a:p>
+                      <a:pPr algn="just">
+                        <a:spcAft>
+                          <a:spcPts val="0"/>
+                        </a:spcAft>
+                      </a:pPr>
+                      <a:r>
+                        <a:rPr lang="en-US" sz="1600" b="0" i="0" kern="100">
+                          <a:effectLst/>
+                          <a:latin typeface="微软雅黑" panose="020B0503020204020204" charset="-122"/>
+                          <a:ea typeface="微软雅黑" panose="020B0503020204020204" charset="-122"/>
+                          <a:cs typeface="微软雅黑" panose="020B0503020204020204" charset="-122"/>
+                        </a:rPr>
+                        <a:t>9787302426820</a:t>
+                      </a:r>
+                      <a:endParaRPr lang="zh-CN" sz="1600" b="0" i="0" kern="100">
+                        <a:effectLst/>
+                        <a:latin typeface="微软雅黑" panose="020B0503020204020204" charset="-122"/>
+                        <a:ea typeface="微软雅黑" panose="020B0503020204020204" charset="-122"/>
+                        <a:cs typeface="微软雅黑" panose="020B0503020204020204" charset="-122"/>
+                      </a:endParaRPr>
+                    </a:p>
+                  </a:txBody>
+                  <a:tcPr marL="68580" marR="68580" marT="0" marB="0">
+                    <a:lnL w="12700" cap="flat" cmpd="sng" algn="ctr">
+                      <a:solidFill>
+                        <a:srgbClr val="000000"/>
+                      </a:solidFill>
+                      <a:prstDash val="solid"/>
+                      <a:round/>
+                      <a:headEnd type="none" w="med" len="med"/>
+                      <a:tailEnd type="none" w="med" len="med"/>
+                    </a:lnL>
+                    <a:lnR w="12700" cap="flat" cmpd="sng" algn="ctr">
+                      <a:solidFill>
+                        <a:srgbClr val="000000"/>
+                      </a:solidFill>
+                      <a:prstDash val="solid"/>
+                      <a:round/>
+                      <a:headEnd type="none" w="med" len="med"/>
+                      <a:tailEnd type="none" w="med" len="med"/>
+                    </a:lnR>
+                    <a:lnT w="12700" cap="flat" cmpd="sng" algn="ctr">
+                      <a:solidFill>
+                        <a:srgbClr val="000000"/>
+                      </a:solidFill>
+                      <a:prstDash val="solid"/>
+                      <a:round/>
+                      <a:headEnd type="none" w="med" len="med"/>
+                      <a:tailEnd type="none" w="med" len="med"/>
+                    </a:lnT>
+                    <a:lnB w="12700" cap="flat" cmpd="sng" algn="ctr">
+                      <a:solidFill>
+                        <a:srgbClr val="000000"/>
+                      </a:solidFill>
+                      <a:prstDash val="solid"/>
+                      <a:round/>
+                      <a:headEnd type="none" w="med" len="med"/>
+                      <a:tailEnd type="none" w="med" len="med"/>
+                    </a:lnB>
+                    <a:solidFill>
+                      <a:srgbClr val="FFFFFF"/>
+                    </a:solidFill>
+                  </a:tcPr>
+                </a:tc>
+                <a:tc>
+                  <a:txBody>
+                    <a:bodyPr/>
+                    <a:p>
+                      <a:pPr algn="just">
+                        <a:spcAft>
+                          <a:spcPts val="0"/>
+                        </a:spcAft>
+                      </a:pPr>
+                      <a:r>
+                        <a:rPr lang="zh-CN" sz="1600" b="0" i="0" kern="100" dirty="0">
+                          <a:effectLst/>
+                          <a:latin typeface="微软雅黑" panose="020B0503020204020204" charset="-122"/>
+                          <a:ea typeface="微软雅黑" panose="020B0503020204020204" charset="-122"/>
+                          <a:cs typeface="微软雅黑" panose="020B0503020204020204" charset="-122"/>
+                        </a:rPr>
+                        <a:t>《软件需求（第三版）》</a:t>
+                      </a:r>
+                      <a:r>
+                        <a:rPr lang="en-US" sz="1600" b="0" i="0" kern="100" dirty="0">
+                          <a:effectLst/>
+                          <a:latin typeface="微软雅黑" panose="020B0503020204020204" charset="-122"/>
+                          <a:ea typeface="微软雅黑" panose="020B0503020204020204" charset="-122"/>
+                          <a:cs typeface="微软雅黑" panose="020B0503020204020204" charset="-122"/>
+                        </a:rPr>
+                        <a:t>[</a:t>
+                      </a:r>
+                      <a:r>
+                        <a:rPr lang="zh-CN" sz="1600" b="0" i="0" kern="100" dirty="0">
+                          <a:effectLst/>
+                          <a:latin typeface="微软雅黑" panose="020B0503020204020204" charset="-122"/>
+                          <a:ea typeface="微软雅黑" panose="020B0503020204020204" charset="-122"/>
+                          <a:cs typeface="微软雅黑" panose="020B0503020204020204" charset="-122"/>
+                        </a:rPr>
+                        <a:t>美</a:t>
+                      </a:r>
+                      <a:r>
+                        <a:rPr lang="en-US" sz="1600" b="0" i="0" kern="100" dirty="0">
+                          <a:effectLst/>
+                          <a:latin typeface="微软雅黑" panose="020B0503020204020204" charset="-122"/>
+                          <a:ea typeface="微软雅黑" panose="020B0503020204020204" charset="-122"/>
+                          <a:cs typeface="微软雅黑" panose="020B0503020204020204" charset="-122"/>
+                        </a:rPr>
+                        <a:t>]</a:t>
+                      </a:r>
+                      <a:r>
+                        <a:rPr lang="en-US" sz="1600" b="0" i="0" kern="100" dirty="0" err="1">
+                          <a:effectLst/>
+                          <a:latin typeface="微软雅黑" panose="020B0503020204020204" charset="-122"/>
+                          <a:ea typeface="微软雅黑" panose="020B0503020204020204" charset="-122"/>
+                          <a:cs typeface="微软雅黑" panose="020B0503020204020204" charset="-122"/>
+                        </a:rPr>
+                        <a:t>KarlWiegers</a:t>
+                      </a:r>
+                      <a:r>
+                        <a:rPr lang="en-US" sz="1600" b="0" i="0" kern="100" dirty="0">
+                          <a:effectLst/>
+                          <a:latin typeface="微软雅黑" panose="020B0503020204020204" charset="-122"/>
+                          <a:ea typeface="微软雅黑" panose="020B0503020204020204" charset="-122"/>
+                          <a:cs typeface="微软雅黑" panose="020B0503020204020204" charset="-122"/>
+                        </a:rPr>
+                        <a:t> </a:t>
+                      </a:r>
+                      <a:r>
+                        <a:rPr lang="en-US" sz="1600" b="0" i="0" kern="100" dirty="0" err="1">
+                          <a:effectLst/>
+                          <a:latin typeface="微软雅黑" panose="020B0503020204020204" charset="-122"/>
+                          <a:ea typeface="微软雅黑" panose="020B0503020204020204" charset="-122"/>
+                          <a:cs typeface="微软雅黑" panose="020B0503020204020204" charset="-122"/>
+                        </a:rPr>
+                        <a:t>JoyBeatty</a:t>
+                      </a:r>
+                      <a:r>
+                        <a:rPr lang="zh-CN" sz="1600" b="0" i="0" kern="100" dirty="0">
+                          <a:effectLst/>
+                          <a:latin typeface="微软雅黑" panose="020B0503020204020204" charset="-122"/>
+                          <a:ea typeface="微软雅黑" panose="020B0503020204020204" charset="-122"/>
+                          <a:cs typeface="微软雅黑" panose="020B0503020204020204" charset="-122"/>
+                        </a:rPr>
+                        <a:t>，李忠利、李淳、霍金健、孔晨辉译</a:t>
+                      </a:r>
+                      <a:endParaRPr lang="zh-CN" sz="1600" b="0" i="0" kern="100" dirty="0">
+                        <a:effectLst/>
+                        <a:latin typeface="微软雅黑" panose="020B0503020204020204" charset="-122"/>
+                        <a:ea typeface="微软雅黑" panose="020B0503020204020204" charset="-122"/>
+                        <a:cs typeface="微软雅黑" panose="020B0503020204020204" charset="-122"/>
+                      </a:endParaRPr>
+                    </a:p>
+                  </a:txBody>
+                  <a:tcPr marL="68580" marR="68580" marT="0" marB="0">
+                    <a:lnL w="12700" cap="flat" cmpd="sng" algn="ctr">
+                      <a:solidFill>
+                        <a:srgbClr val="000000"/>
+                      </a:solidFill>
+                      <a:prstDash val="solid"/>
+                      <a:round/>
+                      <a:headEnd type="none" w="med" len="med"/>
+                      <a:tailEnd type="none" w="med" len="med"/>
+                    </a:lnL>
+                    <a:lnR w="12700" cap="flat" cmpd="sng" algn="ctr">
+                      <a:solidFill>
+                        <a:srgbClr val="000000"/>
+                      </a:solidFill>
+                      <a:prstDash val="solid"/>
+                      <a:round/>
+                      <a:headEnd type="none" w="med" len="med"/>
+                      <a:tailEnd type="none" w="med" len="med"/>
+                    </a:lnR>
+                    <a:lnT w="12700" cap="flat" cmpd="sng" algn="ctr">
+                      <a:solidFill>
+                        <a:srgbClr val="000000"/>
+                      </a:solidFill>
+                      <a:prstDash val="solid"/>
+                      <a:round/>
+                      <a:headEnd type="none" w="med" len="med"/>
+                      <a:tailEnd type="none" w="med" len="med"/>
+                    </a:lnT>
+                    <a:lnB w="12700" cap="flat" cmpd="sng" algn="ctr">
+                      <a:solidFill>
+                        <a:srgbClr val="000000"/>
+                      </a:solidFill>
+                      <a:prstDash val="solid"/>
+                      <a:round/>
+                      <a:headEnd type="none" w="med" len="med"/>
+                      <a:tailEnd type="none" w="med" len="med"/>
+                    </a:lnB>
+                    <a:solidFill>
+                      <a:srgbClr val="FFFFFF"/>
+                    </a:solidFill>
+                  </a:tcPr>
+                </a:tc>
+                <a:tc>
+                  <a:txBody>
+                    <a:bodyPr/>
+                    <a:p>
+                      <a:pPr algn="just">
+                        <a:spcAft>
+                          <a:spcPts val="0"/>
+                        </a:spcAft>
+                      </a:pPr>
+                      <a:r>
+                        <a:rPr lang="en-US" sz="1600" b="0" i="0" kern="100">
+                          <a:effectLst/>
+                          <a:latin typeface="微软雅黑" panose="020B0503020204020204" charset="-122"/>
+                          <a:ea typeface="微软雅黑" panose="020B0503020204020204" charset="-122"/>
+                          <a:cs typeface="微软雅黑" panose="020B0503020204020204" charset="-122"/>
+                        </a:rPr>
+                        <a:t>3-1</a:t>
+                      </a:r>
+                      <a:endParaRPr lang="zh-CN" sz="1600" b="0" i="0" kern="100">
+                        <a:effectLst/>
+                        <a:latin typeface="微软雅黑" panose="020B0503020204020204" charset="-122"/>
+                        <a:ea typeface="微软雅黑" panose="020B0503020204020204" charset="-122"/>
+                        <a:cs typeface="微软雅黑" panose="020B0503020204020204" charset="-122"/>
+                      </a:endParaRPr>
+                    </a:p>
+                  </a:txBody>
+                  <a:tcPr marL="68580" marR="68580" marT="0" marB="0">
+                    <a:lnL w="12700" cap="flat" cmpd="sng" algn="ctr">
+                      <a:solidFill>
+                        <a:srgbClr val="000000"/>
+                      </a:solidFill>
+                      <a:prstDash val="solid"/>
+                      <a:round/>
+                      <a:headEnd type="none" w="med" len="med"/>
+                      <a:tailEnd type="none" w="med" len="med"/>
+                    </a:lnL>
+                    <a:lnR w="12700" cap="flat" cmpd="sng" algn="ctr">
+                      <a:solidFill>
+                        <a:srgbClr val="000000"/>
+                      </a:solidFill>
+                      <a:prstDash val="solid"/>
+                      <a:round/>
+                      <a:headEnd type="none" w="med" len="med"/>
+                      <a:tailEnd type="none" w="med" len="med"/>
+                    </a:lnR>
+                    <a:lnT w="12700" cap="flat" cmpd="sng" algn="ctr">
+                      <a:solidFill>
+                        <a:srgbClr val="000000"/>
+                      </a:solidFill>
+                      <a:prstDash val="solid"/>
+                      <a:round/>
+                      <a:headEnd type="none" w="med" len="med"/>
+                      <a:tailEnd type="none" w="med" len="med"/>
+                    </a:lnT>
+                    <a:lnB w="12700" cap="flat" cmpd="sng" algn="ctr">
+                      <a:solidFill>
+                        <a:srgbClr val="000000"/>
+                      </a:solidFill>
+                      <a:prstDash val="solid"/>
+                      <a:round/>
+                      <a:headEnd type="none" w="med" len="med"/>
+                      <a:tailEnd type="none" w="med" len="med"/>
+                    </a:lnB>
+                    <a:solidFill>
+                      <a:srgbClr val="FFFFFF"/>
+                    </a:solidFill>
+                  </a:tcPr>
+                </a:tc>
+                <a:tc>
+                  <a:txBody>
+                    <a:bodyPr/>
+                    <a:p>
+                      <a:pPr algn="just">
+                        <a:spcAft>
+                          <a:spcPts val="0"/>
+                        </a:spcAft>
+                      </a:pPr>
+                      <a:r>
+                        <a:rPr lang="en-US" sz="1600" b="0" i="0" kern="100" dirty="0">
+                          <a:effectLst/>
+                          <a:latin typeface="微软雅黑" panose="020B0503020204020204" charset="-122"/>
+                          <a:ea typeface="微软雅黑" panose="020B0503020204020204" charset="-122"/>
+                          <a:cs typeface="微软雅黑" panose="020B0503020204020204" charset="-122"/>
+                        </a:rPr>
+                        <a:t>2016.03.01</a:t>
+                      </a:r>
+                      <a:endParaRPr lang="zh-CN" sz="1600" b="0" i="0" kern="100" dirty="0">
+                        <a:effectLst/>
+                        <a:latin typeface="微软雅黑" panose="020B0503020204020204" charset="-122"/>
+                        <a:ea typeface="微软雅黑" panose="020B0503020204020204" charset="-122"/>
+                        <a:cs typeface="微软雅黑" panose="020B0503020204020204" charset="-122"/>
+                      </a:endParaRPr>
+                    </a:p>
+                  </a:txBody>
+                  <a:tcPr marL="68580" marR="68580" marT="0" marB="0">
+                    <a:lnL w="12700" cap="flat" cmpd="sng" algn="ctr">
+                      <a:solidFill>
+                        <a:srgbClr val="000000"/>
+                      </a:solidFill>
+                      <a:prstDash val="solid"/>
+                      <a:round/>
+                      <a:headEnd type="none" w="med" len="med"/>
+                      <a:tailEnd type="none" w="med" len="med"/>
+                    </a:lnL>
+                    <a:lnR w="12700" cap="flat" cmpd="sng" algn="ctr">
+                      <a:solidFill>
+                        <a:srgbClr val="000000"/>
+                      </a:solidFill>
+                      <a:prstDash val="solid"/>
+                      <a:round/>
+                      <a:headEnd type="none" w="med" len="med"/>
+                      <a:tailEnd type="none" w="med" len="med"/>
+                    </a:lnR>
+                    <a:lnT w="12700" cap="flat" cmpd="sng" algn="ctr">
+                      <a:solidFill>
+                        <a:srgbClr val="000000"/>
+                      </a:solidFill>
+                      <a:prstDash val="solid"/>
+                      <a:round/>
+                      <a:headEnd type="none" w="med" len="med"/>
+                      <a:tailEnd type="none" w="med" len="med"/>
+                    </a:lnT>
+                    <a:lnB w="12700" cap="flat" cmpd="sng" algn="ctr">
+                      <a:solidFill>
+                        <a:srgbClr val="000000"/>
+                      </a:solidFill>
+                      <a:prstDash val="solid"/>
+                      <a:round/>
+                      <a:headEnd type="none" w="med" len="med"/>
+                      <a:tailEnd type="none" w="med" len="med"/>
+                    </a:lnB>
+                    <a:solidFill>
+                      <a:srgbClr val="FFFFFF"/>
+                    </a:solidFill>
+                  </a:tcPr>
+                </a:tc>
+              </a:tr>
+            </a:tbl>
+          </a:graphicData>
+        </a:graphic>
+      </p:graphicFrame>
     </p:spTree>
     <p:custDataLst>
       <p:tags r:id="rId5"/>
@@ -14909,7 +15806,7 @@
         </p:nvSpPr>
         <p:spPr>
           <a:xfrm>
-            <a:off x="7819390" y="3356591"/>
+            <a:off x="7809230" y="3679806"/>
             <a:ext cx="2540635" cy="492760"/>
           </a:xfrm>
           <a:prstGeom prst="rect">
@@ -14965,7 +15862,7 @@
         </p:nvSpPr>
         <p:spPr>
           <a:xfrm>
-            <a:off x="7809228" y="1517136"/>
+            <a:off x="7799068" y="1840351"/>
             <a:ext cx="2524760" cy="492125"/>
           </a:xfrm>
           <a:prstGeom prst="rect">
@@ -15090,7 +15987,7 @@
         </p:nvSpPr>
         <p:spPr>
           <a:xfrm>
-            <a:off x="7819389" y="2709408"/>
+            <a:off x="7809229" y="3032623"/>
             <a:ext cx="2540635" cy="492760"/>
           </a:xfrm>
           <a:prstGeom prst="rect">
@@ -15176,7 +16073,7 @@
         </p:nvSpPr>
         <p:spPr>
           <a:xfrm>
-            <a:off x="7154229" y="4999107"/>
+            <a:off x="7165024" y="4261872"/>
             <a:ext cx="374015" cy="374015"/>
           </a:xfrm>
           <a:prstGeom prst="diamond">
@@ -15250,7 +16147,7 @@
         </p:nvSpPr>
         <p:spPr>
           <a:xfrm>
-            <a:off x="7809230" y="5036787"/>
+            <a:off x="7820025" y="4299552"/>
             <a:ext cx="2540635" cy="492760"/>
           </a:xfrm>
           <a:prstGeom prst="rect">
@@ -15305,7 +16202,7 @@
         </p:nvSpPr>
         <p:spPr>
           <a:xfrm>
-            <a:off x="7173915" y="1521380"/>
+            <a:off x="7163755" y="1844595"/>
             <a:ext cx="374015" cy="374015"/>
           </a:xfrm>
           <a:prstGeom prst="diamond">
@@ -15379,7 +16276,7 @@
         </p:nvSpPr>
         <p:spPr>
           <a:xfrm>
-            <a:off x="7156135" y="2742196"/>
+            <a:off x="7145975" y="3065411"/>
             <a:ext cx="374015" cy="374015"/>
           </a:xfrm>
           <a:prstGeom prst="diamond">
@@ -15453,7 +16350,7 @@
         </p:nvSpPr>
         <p:spPr>
           <a:xfrm>
-            <a:off x="7173915" y="3365842"/>
+            <a:off x="7163755" y="3689057"/>
             <a:ext cx="374015" cy="374015"/>
           </a:xfrm>
           <a:prstGeom prst="diamond">
@@ -15527,7 +16424,7 @@
         </p:nvSpPr>
         <p:spPr>
           <a:xfrm>
-            <a:off x="7164389" y="5578850"/>
+            <a:off x="7175184" y="4841615"/>
             <a:ext cx="374015" cy="374015"/>
           </a:xfrm>
           <a:prstGeom prst="diamond">
@@ -15601,7 +16498,7 @@
         </p:nvSpPr>
         <p:spPr>
           <a:xfrm>
-            <a:off x="7819390" y="5578850"/>
+            <a:off x="7830185" y="4841615"/>
             <a:ext cx="2540635" cy="492760"/>
           </a:xfrm>
           <a:prstGeom prst="rect">
@@ -15657,7 +16554,7 @@
         </p:nvSpPr>
         <p:spPr>
           <a:xfrm>
-            <a:off x="7154229" y="6070808"/>
+            <a:off x="7182804" y="5378023"/>
             <a:ext cx="374015" cy="374015"/>
           </a:xfrm>
           <a:prstGeom prst="diamond">
@@ -15731,7 +16628,7 @@
         </p:nvSpPr>
         <p:spPr>
           <a:xfrm>
-            <a:off x="7809230" y="6070808"/>
+            <a:off x="7837805" y="5378023"/>
             <a:ext cx="2540635" cy="492760"/>
           </a:xfrm>
           <a:prstGeom prst="rect">
@@ -15786,7 +16683,7 @@
         </p:nvSpPr>
         <p:spPr>
           <a:xfrm>
-            <a:off x="7819389" y="2137908"/>
+            <a:off x="7809229" y="2461123"/>
             <a:ext cx="2540635" cy="492760"/>
           </a:xfrm>
           <a:prstGeom prst="rect">
@@ -15841,7 +16738,7 @@
         </p:nvSpPr>
         <p:spPr>
           <a:xfrm>
-            <a:off x="7156135" y="2170696"/>
+            <a:off x="7145975" y="2493911"/>
             <a:ext cx="374015" cy="374015"/>
           </a:xfrm>
           <a:prstGeom prst="diamond">
@@ -17032,7 +17929,7 @@
         <p:spPr>
           <a:xfrm>
             <a:off x="1338321" y="1120794"/>
-            <a:ext cx="1633220" cy="645160"/>
+            <a:ext cx="1402080" cy="645160"/>
           </a:xfrm>
           <a:prstGeom prst="rect">
             <a:avLst/>
@@ -17050,35 +17947,95 @@
               </a:lnSpc>
             </a:pPr>
             <a:r>
-              <a:rPr lang="en-US" altLang="zh-CN" sz="2400" dirty="0"/>
-              <a:t>2.</a:t>
-            </a:r>
-            <a:r>
-              <a:rPr lang="zh-CN" altLang="en-US" sz="2400" dirty="0"/>
-              <a:t>用户特征</a:t>
-            </a:r>
-            <a:endParaRPr lang="zh-CN" altLang="en-US" sz="2400" dirty="0"/>
+              <a:rPr lang="zh-CN" sz="2400" dirty="0"/>
+              <a:t>用户访谈</a:t>
+            </a:r>
+            <a:endParaRPr lang="zh-CN" sz="2400" dirty="0"/>
+          </a:p>
+        </p:txBody>
+      </p:sp>
+      <p:sp>
+        <p:nvSpPr>
+          <p:cNvPr id="3" name="文本框 2">
+            <a:hlinkClick r:id="rId9" action="ppaction://hlinkfile"/>
+          </p:cNvPr>
+          <p:cNvSpPr txBox="1"/>
+          <p:nvPr/>
+        </p:nvSpPr>
+        <p:spPr>
+          <a:xfrm>
+            <a:off x="1304290" y="2724150"/>
+            <a:ext cx="4270375" cy="368300"/>
+          </a:xfrm>
+          <a:prstGeom prst="rect">
+            <a:avLst/>
+          </a:prstGeom>
+          <a:noFill/>
+        </p:spPr>
+        <p:txBody>
+          <a:bodyPr wrap="none" rtlCol="0">
+            <a:spAutoFit/>
+          </a:bodyPr>
+          <a:p>
+            <a:pPr algn="l"/>
+            <a:r>
+              <a:rPr lang="zh-CN" altLang="en-US"/>
+              <a:t>2020-11-15范丽娜 用户需求分析访谈记录</a:t>
+            </a:r>
+            <a:endParaRPr lang="zh-CN" altLang="en-US"/>
+          </a:p>
+        </p:txBody>
+      </p:sp>
+      <p:sp>
+        <p:nvSpPr>
+          <p:cNvPr id="4" name="文本框 3">
+            <a:hlinkClick r:id="rId10" action="ppaction://hlinkfile"/>
+          </p:cNvPr>
+          <p:cNvSpPr txBox="1"/>
+          <p:nvPr/>
+        </p:nvSpPr>
+        <p:spPr>
+          <a:xfrm>
+            <a:off x="1304290" y="2105025"/>
+            <a:ext cx="4270375" cy="368300"/>
+          </a:xfrm>
+          <a:prstGeom prst="rect">
+            <a:avLst/>
+          </a:prstGeom>
+          <a:noFill/>
+        </p:spPr>
+        <p:txBody>
+          <a:bodyPr wrap="none" rtlCol="0">
+            <a:spAutoFit/>
+          </a:bodyPr>
+          <a:p>
+            <a:pPr algn="l"/>
+            <a:r>
+              <a:rPr lang="zh-CN" altLang="en-US"/>
+              <a:t>2020-11-15李雯婷 用户需求分析访谈记录</a:t>
+            </a:r>
+            <a:endParaRPr lang="zh-CN" altLang="en-US"/>
           </a:p>
         </p:txBody>
       </p:sp>
       <p:pic>
         <p:nvPicPr>
-          <p:cNvPr id="11" name="图片 10"/>
+          <p:cNvPr id="5" name="图片 4"/>
           <p:cNvPicPr>
             <a:picLocks noChangeAspect="1"/>
           </p:cNvPicPr>
           <p:nvPr/>
         </p:nvPicPr>
         <p:blipFill>
-          <a:blip r:embed="rId9"/>
+          <a:blip r:embed="rId11"/>
           <a:stretch>
             <a:fillRect/>
           </a:stretch>
         </p:blipFill>
         <p:spPr>
           <a:xfrm>
-            <a:off x="1831340" y="2661285"/>
-            <a:ext cx="9090025" cy="2365375"/>
+            <a:off x="6826250" y="514350"/>
+            <a:ext cx="4446270" cy="5887720"/>
           </a:xfrm>
           <a:prstGeom prst="rect">
             <a:avLst/>
@@ -17087,7 +18044,7 @@
       </p:pic>
     </p:spTree>
     <p:custDataLst>
-      <p:tags r:id="rId10"/>
+      <p:tags r:id="rId12"/>
     </p:custDataLst>
   </p:cSld>
   <p:clrMapOvr>
@@ -18768,7 +19725,7 @@
         <p:spPr>
           <a:xfrm>
             <a:off x="6452075" y="6070307"/>
-            <a:ext cx="3324314" cy="369332"/>
+            <a:ext cx="3324314" cy="368300"/>
           </a:xfrm>
           <a:prstGeom prst="rect">
             <a:avLst/>
@@ -18783,7 +19740,7 @@
           <a:p>
             <a:r>
               <a:rPr lang="zh-CN" altLang="en-US" dirty="0" smtClean="0"/>
-              <a:t>浙大城市学院 软件工程</a:t>
+              <a:t>浙大城市学院 临床医学</a:t>
             </a:r>
             <a:r>
               <a:rPr lang="en-US" altLang="zh-CN" dirty="0" smtClean="0"/>
@@ -18806,7 +19763,7 @@
         <p:spPr>
           <a:xfrm>
             <a:off x="8576506" y="5297205"/>
-            <a:ext cx="1199881" cy="461665"/>
+            <a:ext cx="1199881" cy="460375"/>
           </a:xfrm>
           <a:prstGeom prst="rect">
             <a:avLst/>
@@ -18821,7 +19778,7 @@
           <a:p>
             <a:r>
               <a:rPr lang="zh-CN" altLang="en-US" sz="2400" dirty="0"/>
-              <a:t>张景雄</a:t>
+              <a:t>李雯婷</a:t>
             </a:r>
             <a:endParaRPr lang="zh-CN" altLang="en-US" sz="2400" dirty="0"/>
           </a:p>
@@ -19700,13 +20657,12 @@
               </a:rPr>
               <a:t>应用目标</a:t>
             </a:r>
-            <a:r>
-              <a:rPr lang="zh-CN" sz="2400" b="0">
-                <a:ea typeface="宋体" panose="02010600030101010101" pitchFamily="2" charset="-122"/>
-              </a:rPr>
-              <a:t>-</a:t>
-            </a:r>
+            <a:endParaRPr lang="zh-CN" sz="2400" b="0">
+              <a:ea typeface="宋体" panose="02010600030101010101" pitchFamily="2" charset="-122"/>
+            </a:endParaRPr>
+          </a:p>
+          <a:p>
+            <a:pPr indent="0"/>
             <a:r>
               <a:rPr lang="en-US" sz="2400" b="0"/>
               <a:t>	</a:t>
@@ -19756,13 +20712,12 @@
               </a:rPr>
               <a:t>作用范围</a:t>
             </a:r>
-            <a:r>
-              <a:rPr lang="zh-CN" sz="2400" b="0">
-                <a:ea typeface="宋体" panose="02010600030101010101" pitchFamily="2" charset="-122"/>
-              </a:rPr>
-              <a:t>-</a:t>
-            </a:r>
+            <a:endParaRPr lang="zh-CN" sz="2400" b="0">
+              <a:ea typeface="宋体" panose="02010600030101010101" pitchFamily="2" charset="-122"/>
+            </a:endParaRPr>
+          </a:p>
+          <a:p>
+            <a:pPr indent="0"/>
             <a:r>
               <a:rPr lang="en-US" altLang="zh-CN" sz="2400" b="0">
                 <a:ea typeface="宋体" panose="02010600030101010101" pitchFamily="2" charset="-122"/>
@@ -19773,9 +20728,14 @@
               <a:rPr lang="zh-CN" sz="2400" b="0">
                 <a:ea typeface="宋体" panose="02010600030101010101" pitchFamily="2" charset="-122"/>
               </a:rPr>
-              <a:t>产品范围界定：试用于浙江大学城市学院在校学生和教师-</a:t>
-            </a:r>
+              <a:t>产品范围界定：试用于浙江大学城市学院在校学生和教师</a:t>
+            </a:r>
+            <a:endParaRPr lang="zh-CN" sz="2400" b="0">
+              <a:ea typeface="宋体" panose="02010600030101010101" pitchFamily="2" charset="-122"/>
+            </a:endParaRPr>
+          </a:p>
+          <a:p>
+            <a:pPr indent="0"/>
             <a:r>
               <a:rPr lang="en-US" altLang="zh-CN" sz="2400" b="0">
                 <a:ea typeface="宋体" panose="02010600030101010101" pitchFamily="2" charset="-122"/>
@@ -21706,20 +22666,7 @@
 
 <file path=ppt/tags/tag173.xml><?xml version="1.0" encoding="utf-8"?>
 <p:tagLst xmlns:p="http://schemas.openxmlformats.org/presentationml/2006/main">
-  <p:tag name="KSO_WM_SLIDE_ID" val="custom20204473_7"/>
-  <p:tag name="KSO_WM_TEMPLATE_SUBCATEGORY" val="17"/>
-  <p:tag name="KSO_WM_TEMPLATE_MASTER_TYPE" val="1"/>
-  <p:tag name="KSO_WM_TEMPLATE_COLOR_TYPE" val="1"/>
-  <p:tag name="KSO_WM_SLIDE_TYPE" val="sectionTitle"/>
-  <p:tag name="KSO_WM_SLIDE_SUBTYPE" val="pureTxt"/>
-  <p:tag name="KSO_WM_SLIDE_ITEM_CNT" val="0"/>
-  <p:tag name="KSO_WM_SLIDE_INDEX" val="7"/>
-  <p:tag name="KSO_WM_TAG_VERSION" val="1.0"/>
-  <p:tag name="KSO_WM_BEAUTIFY_FLAG" val="#wm#"/>
-  <p:tag name="KSO_WM_TEMPLATE_CATEGORY" val="custom"/>
-  <p:tag name="KSO_WM_TEMPLATE_INDEX" val="20204473"/>
-  <p:tag name="KSO_WM_SLIDE_LAYOUT" val="a_b_e"/>
-  <p:tag name="KSO_WM_SLIDE_LAYOUT_CNT" val="1_1_1"/>
+  <p:tag name="KSO_WM_UNIT_TABLE_BEAUTIFY" val="smartTable{9c5877c5-1a84-4b0d-9d7a-0bbc6d9b9c4b}"/>
 </p:tagLst>
 </file>
 
@@ -21743,6 +22690,25 @@
 </file>
 
 <file path=ppt/tags/tag175.xml><?xml version="1.0" encoding="utf-8"?>
+<p:tagLst xmlns:p="http://schemas.openxmlformats.org/presentationml/2006/main">
+  <p:tag name="KSO_WM_SLIDE_ID" val="custom20204473_7"/>
+  <p:tag name="KSO_WM_TEMPLATE_SUBCATEGORY" val="17"/>
+  <p:tag name="KSO_WM_TEMPLATE_MASTER_TYPE" val="1"/>
+  <p:tag name="KSO_WM_TEMPLATE_COLOR_TYPE" val="1"/>
+  <p:tag name="KSO_WM_SLIDE_TYPE" val="sectionTitle"/>
+  <p:tag name="KSO_WM_SLIDE_SUBTYPE" val="pureTxt"/>
+  <p:tag name="KSO_WM_SLIDE_ITEM_CNT" val="0"/>
+  <p:tag name="KSO_WM_SLIDE_INDEX" val="7"/>
+  <p:tag name="KSO_WM_TAG_VERSION" val="1.0"/>
+  <p:tag name="KSO_WM_BEAUTIFY_FLAG" val="#wm#"/>
+  <p:tag name="KSO_WM_TEMPLATE_CATEGORY" val="custom"/>
+  <p:tag name="KSO_WM_TEMPLATE_INDEX" val="20204473"/>
+  <p:tag name="KSO_WM_SLIDE_LAYOUT" val="a_b_e"/>
+  <p:tag name="KSO_WM_SLIDE_LAYOUT_CNT" val="1_1_1"/>
+</p:tagLst>
+</file>
+
+<file path=ppt/tags/tag176.xml><?xml version="1.0" encoding="utf-8"?>
 <p:tagLst xmlns:p="http://schemas.openxmlformats.org/presentationml/2006/main">
   <p:tag name="ISLIDE TOOLS.GUIDESSETTING" val="{&quot;Id&quot;:&quot;GuidesStyle_Normal&quot;,&quot;Name&quot;:&quot;正常&quot;,&quot;HeaderHeight&quot;:10.0,&quot;FooterHeight&quot;:4.0,&quot;SideMargin&quot;:3.0,&quot;TopMargin&quot;:3.0,&quot;BottomMargin&quot;:3.0,&quot;IntervalMargin&quot;:3.0}"/>
   <p:tag name="ISPRING_PRESENTATION_TITLE" val="PowerPoint 演示文稿"/>

</xml_diff>